<commit_message>
Ajout de la deuxième capture d'écrans et commencement du fichier html
</commit_message>
<xml_diff>
--- a/CaptureEcrans.pptx
+++ b/CaptureEcrans.pptx
@@ -5,7 +5,9 @@
     <p:sldMasterId id="2147483648" r:id="rId1"/>
   </p:sldMasterIdLst>
   <p:sldIdLst>
-    <p:sldId id="256" r:id="rId2"/>
+    <p:sldId id="257" r:id="rId2"/>
+    <p:sldId id="256" r:id="rId3"/>
+    <p:sldId id="258" r:id="rId4"/>
   </p:sldIdLst>
   <p:sldSz cx="12192000" cy="6858000"/>
   <p:notesSz cx="6858000" cy="9144000"/>
@@ -104,6 +106,11 @@
       </a:defRPr>
     </a:lvl9pPr>
   </p:defaultTextStyle>
+  <p:extLst>
+    <p:ext uri="{EFAFB233-063F-42B5-8137-9DF3F51BA10A}">
+      <p15:sldGuideLst xmlns:p15="http://schemas.microsoft.com/office/powerpoint/2012/main"/>
+    </p:ext>
+  </p:extLst>
 </p:presentation>
 </file>
 
@@ -111,8 +118,8 @@
 <pc:chgInfo xmlns:a="http://schemas.openxmlformats.org/drawingml/2006/main" xmlns:r="http://schemas.openxmlformats.org/officeDocument/2006/relationships" xmlns:ac="http://schemas.microsoft.com/office/drawing/2013/main/command" xmlns:pc="http://schemas.microsoft.com/office/powerpoint/2013/main/command">
   <pc:docChgLst>
     <pc:chgData name="Isaac-Fukumoto, Yulia-Rhose" userId="6416a4be-602d-4575-8ff4-f8d035edf943" providerId="ADAL" clId="{69D10CC7-7776-4103-99D3-68A8815DCB6B}"/>
-    <pc:docChg chg="modSld">
-      <pc:chgData name="Isaac-Fukumoto, Yulia-Rhose" userId="6416a4be-602d-4575-8ff4-f8d035edf943" providerId="ADAL" clId="{69D10CC7-7776-4103-99D3-68A8815DCB6B}" dt="2024-06-02T16:33:55.100" v="0" actId="22"/>
+    <pc:docChg chg="custSel addSld modSld sldOrd">
+      <pc:chgData name="Isaac-Fukumoto, Yulia-Rhose" userId="6416a4be-602d-4575-8ff4-f8d035edf943" providerId="ADAL" clId="{69D10CC7-7776-4103-99D3-68A8815DCB6B}" dt="2024-06-02T21:31:21.399" v="80" actId="22"/>
       <pc:docMkLst>
         <pc:docMk/>
       </pc:docMkLst>
@@ -128,6 +135,44 @@
             <pc:docMk/>
             <pc:sldMk cId="1643032430" sldId="256"/>
             <ac:picMk id="5" creationId="{AC73FB95-F0F9-A1E7-8AB7-377542CB13A5}"/>
+          </ac:picMkLst>
+        </pc:picChg>
+      </pc:sldChg>
+      <pc:sldChg chg="modSp new mod ord">
+        <pc:chgData name="Isaac-Fukumoto, Yulia-Rhose" userId="6416a4be-602d-4575-8ff4-f8d035edf943" providerId="ADAL" clId="{69D10CC7-7776-4103-99D3-68A8815DCB6B}" dt="2024-06-02T21:19:26.171" v="78"/>
+        <pc:sldMkLst>
+          <pc:docMk/>
+          <pc:sldMk cId="3359079686" sldId="257"/>
+        </pc:sldMkLst>
+        <pc:spChg chg="mod">
+          <ac:chgData name="Isaac-Fukumoto, Yulia-Rhose" userId="6416a4be-602d-4575-8ff4-f8d035edf943" providerId="ADAL" clId="{69D10CC7-7776-4103-99D3-68A8815DCB6B}" dt="2024-06-02T21:17:47.759" v="65" actId="20577"/>
+          <ac:spMkLst>
+            <pc:docMk/>
+            <pc:sldMk cId="3359079686" sldId="257"/>
+            <ac:spMk id="2" creationId="{419D3B65-AE39-5071-B578-92FEAA0D37DE}"/>
+          </ac:spMkLst>
+        </pc:spChg>
+        <pc:spChg chg="mod">
+          <ac:chgData name="Isaac-Fukumoto, Yulia-Rhose" userId="6416a4be-602d-4575-8ff4-f8d035edf943" providerId="ADAL" clId="{69D10CC7-7776-4103-99D3-68A8815DCB6B}" dt="2024-06-02T21:19:22.695" v="76" actId="20577"/>
+          <ac:spMkLst>
+            <pc:docMk/>
+            <pc:sldMk cId="3359079686" sldId="257"/>
+            <ac:spMk id="3" creationId="{38CE85D3-141D-16B1-347C-94E6899220A4}"/>
+          </ac:spMkLst>
+        </pc:spChg>
+      </pc:sldChg>
+      <pc:sldChg chg="addSp new mod">
+        <pc:chgData name="Isaac-Fukumoto, Yulia-Rhose" userId="6416a4be-602d-4575-8ff4-f8d035edf943" providerId="ADAL" clId="{69D10CC7-7776-4103-99D3-68A8815DCB6B}" dt="2024-06-02T21:31:21.399" v="80" actId="22"/>
+        <pc:sldMkLst>
+          <pc:docMk/>
+          <pc:sldMk cId="3151380865" sldId="258"/>
+        </pc:sldMkLst>
+        <pc:picChg chg="add">
+          <ac:chgData name="Isaac-Fukumoto, Yulia-Rhose" userId="6416a4be-602d-4575-8ff4-f8d035edf943" providerId="ADAL" clId="{69D10CC7-7776-4103-99D3-68A8815DCB6B}" dt="2024-06-02T21:31:21.399" v="80" actId="22"/>
+          <ac:picMkLst>
+            <pc:docMk/>
+            <pc:sldMk cId="3151380865" sldId="258"/>
+            <ac:picMk id="3" creationId="{2FEA3A16-BF8D-EE39-36D3-D6283C214E85}"/>
           </ac:picMkLst>
         </pc:picChg>
       </pc:sldChg>
@@ -3376,6 +3421,94 @@
           <p:cNvPr id="2" name="Titre 1">
             <a:extLst>
               <a:ext uri="{FF2B5EF4-FFF2-40B4-BE49-F238E27FC236}">
+                <a16:creationId xmlns:a16="http://schemas.microsoft.com/office/drawing/2014/main" id="{419D3B65-AE39-5071-B578-92FEAA0D37DE}"/>
+              </a:ext>
+            </a:extLst>
+          </p:cNvPr>
+          <p:cNvSpPr>
+            <a:spLocks noGrp="1"/>
+          </p:cNvSpPr>
+          <p:nvPr>
+            <p:ph type="title"/>
+          </p:nvPr>
+        </p:nvSpPr>
+        <p:spPr/>
+        <p:txBody>
+          <a:bodyPr/>
+          <a:lstStyle/>
+          <a:p>
+            <a:r>
+              <a:rPr lang="fr-FR" dirty="0"/>
+              <a:t>Yulia-Rhose Isaac-Fukumoto et Yasmine Slimani TP2 Sécurité</a:t>
+            </a:r>
+            <a:endParaRPr lang="fr-CA" dirty="0"/>
+          </a:p>
+        </p:txBody>
+      </p:sp>
+      <p:sp>
+        <p:nvSpPr>
+          <p:cNvPr id="3" name="Espace réservé du contenu 2">
+            <a:extLst>
+              <a:ext uri="{FF2B5EF4-FFF2-40B4-BE49-F238E27FC236}">
+                <a16:creationId xmlns:a16="http://schemas.microsoft.com/office/drawing/2014/main" id="{38CE85D3-141D-16B1-347C-94E6899220A4}"/>
+              </a:ext>
+            </a:extLst>
+          </p:cNvPr>
+          <p:cNvSpPr>
+            <a:spLocks noGrp="1"/>
+          </p:cNvSpPr>
+          <p:nvPr>
+            <p:ph idx="1"/>
+          </p:nvPr>
+        </p:nvSpPr>
+        <p:spPr/>
+        <p:txBody>
+          <a:bodyPr/>
+          <a:lstStyle/>
+          <a:p>
+            <a:r>
+              <a:rPr lang="fr-FR" dirty="0"/>
+              <a:t>Groupe : 4</a:t>
+            </a:r>
+            <a:endParaRPr lang="fr-CA" dirty="0"/>
+          </a:p>
+        </p:txBody>
+      </p:sp>
+    </p:spTree>
+    <p:extLst>
+      <p:ext uri="{BB962C8B-B14F-4D97-AF65-F5344CB8AC3E}">
+        <p14:creationId xmlns:p14="http://schemas.microsoft.com/office/powerpoint/2010/main" val="3359079686"/>
+      </p:ext>
+    </p:extLst>
+  </p:cSld>
+  <p:clrMapOvr>
+    <a:masterClrMapping/>
+  </p:clrMapOvr>
+</p:sld>
+</file>
+
+<file path=ppt/slides/slide2.xml><?xml version="1.0" encoding="utf-8"?>
+<p:sld xmlns:a="http://schemas.openxmlformats.org/drawingml/2006/main" xmlns:r="http://schemas.openxmlformats.org/officeDocument/2006/relationships" xmlns:p="http://schemas.openxmlformats.org/presentationml/2006/main">
+  <p:cSld>
+    <p:spTree>
+      <p:nvGrpSpPr>
+        <p:cNvPr id="1" name=""/>
+        <p:cNvGrpSpPr/>
+        <p:nvPr/>
+      </p:nvGrpSpPr>
+      <p:grpSpPr>
+        <a:xfrm>
+          <a:off x="0" y="0"/>
+          <a:ext cx="0" cy="0"/>
+          <a:chOff x="0" y="0"/>
+          <a:chExt cx="0" cy="0"/>
+        </a:xfrm>
+      </p:grpSpPr>
+      <p:sp>
+        <p:nvSpPr>
+          <p:cNvPr id="2" name="Titre 1">
+            <a:extLst>
+              <a:ext uri="{FF2B5EF4-FFF2-40B4-BE49-F238E27FC236}">
                 <a16:creationId xmlns:a16="http://schemas.microsoft.com/office/drawing/2014/main" id="{CA3BBA21-4A0B-EB73-6F4C-EE81FAFA414E}"/>
               </a:ext>
             </a:extLst>
@@ -3455,6 +3588,66 @@
     <p:extLst>
       <p:ext uri="{BB962C8B-B14F-4D97-AF65-F5344CB8AC3E}">
         <p14:creationId xmlns:p14="http://schemas.microsoft.com/office/powerpoint/2010/main" val="1643032430"/>
+      </p:ext>
+    </p:extLst>
+  </p:cSld>
+  <p:clrMapOvr>
+    <a:masterClrMapping/>
+  </p:clrMapOvr>
+</p:sld>
+</file>
+
+<file path=ppt/slides/slide3.xml><?xml version="1.0" encoding="utf-8"?>
+<p:sld xmlns:a="http://schemas.openxmlformats.org/drawingml/2006/main" xmlns:r="http://schemas.openxmlformats.org/officeDocument/2006/relationships" xmlns:p="http://schemas.openxmlformats.org/presentationml/2006/main">
+  <p:cSld>
+    <p:spTree>
+      <p:nvGrpSpPr>
+        <p:cNvPr id="1" name=""/>
+        <p:cNvGrpSpPr/>
+        <p:nvPr/>
+      </p:nvGrpSpPr>
+      <p:grpSpPr>
+        <a:xfrm>
+          <a:off x="0" y="0"/>
+          <a:ext cx="0" cy="0"/>
+          <a:chOff x="0" y="0"/>
+          <a:chExt cx="0" cy="0"/>
+        </a:xfrm>
+      </p:grpSpPr>
+      <p:pic>
+        <p:nvPicPr>
+          <p:cNvPr id="3" name="Image 2">
+            <a:extLst>
+              <a:ext uri="{FF2B5EF4-FFF2-40B4-BE49-F238E27FC236}">
+                <a16:creationId xmlns:a16="http://schemas.microsoft.com/office/drawing/2014/main" id="{2FEA3A16-BF8D-EE39-36D3-D6283C214E85}"/>
+              </a:ext>
+            </a:extLst>
+          </p:cNvPr>
+          <p:cNvPicPr>
+            <a:picLocks noChangeAspect="1"/>
+          </p:cNvPicPr>
+          <p:nvPr/>
+        </p:nvPicPr>
+        <p:blipFill>
+          <a:blip r:embed="rId2"/>
+          <a:stretch>
+            <a:fillRect/>
+          </a:stretch>
+        </p:blipFill>
+        <p:spPr>
+          <a:xfrm>
+            <a:off x="6037" y="349091"/>
+            <a:ext cx="12179926" cy="6159817"/>
+          </a:xfrm>
+          <a:prstGeom prst="rect">
+            <a:avLst/>
+          </a:prstGeom>
+        </p:spPr>
+      </p:pic>
+    </p:spTree>
+    <p:extLst>
+      <p:ext uri="{BB962C8B-B14F-4D97-AF65-F5344CB8AC3E}">
+        <p14:creationId xmlns:p14="http://schemas.microsoft.com/office/powerpoint/2010/main" val="3151380865"/>
       </p:ext>
     </p:extLst>
   </p:cSld>

</xml_diff>

<commit_message>
Ajout de la troisième capture d'écrans
</commit_message>
<xml_diff>
--- a/CaptureEcrans.pptx
+++ b/CaptureEcrans.pptx
@@ -8,6 +8,7 @@
     <p:sldId id="257" r:id="rId2"/>
     <p:sldId id="256" r:id="rId3"/>
     <p:sldId id="258" r:id="rId4"/>
+    <p:sldId id="259" r:id="rId5"/>
   </p:sldIdLst>
   <p:sldSz cx="12192000" cy="6858000"/>
   <p:notesSz cx="6858000" cy="9144000"/>
@@ -119,7 +120,7 @@
   <pc:docChgLst>
     <pc:chgData name="Isaac-Fukumoto, Yulia-Rhose" userId="6416a4be-602d-4575-8ff4-f8d035edf943" providerId="ADAL" clId="{69D10CC7-7776-4103-99D3-68A8815DCB6B}"/>
     <pc:docChg chg="custSel addSld modSld sldOrd">
-      <pc:chgData name="Isaac-Fukumoto, Yulia-Rhose" userId="6416a4be-602d-4575-8ff4-f8d035edf943" providerId="ADAL" clId="{69D10CC7-7776-4103-99D3-68A8815DCB6B}" dt="2024-06-02T21:31:21.399" v="80" actId="22"/>
+      <pc:chgData name="Isaac-Fukumoto, Yulia-Rhose" userId="6416a4be-602d-4575-8ff4-f8d035edf943" providerId="ADAL" clId="{69D10CC7-7776-4103-99D3-68A8815DCB6B}" dt="2024-06-02T21:33:49.865" v="82" actId="22"/>
       <pc:docMkLst>
         <pc:docMk/>
       </pc:docMkLst>
@@ -173,6 +174,21 @@
             <pc:docMk/>
             <pc:sldMk cId="3151380865" sldId="258"/>
             <ac:picMk id="3" creationId="{2FEA3A16-BF8D-EE39-36D3-D6283C214E85}"/>
+          </ac:picMkLst>
+        </pc:picChg>
+      </pc:sldChg>
+      <pc:sldChg chg="addSp new mod">
+        <pc:chgData name="Isaac-Fukumoto, Yulia-Rhose" userId="6416a4be-602d-4575-8ff4-f8d035edf943" providerId="ADAL" clId="{69D10CC7-7776-4103-99D3-68A8815DCB6B}" dt="2024-06-02T21:33:49.865" v="82" actId="22"/>
+        <pc:sldMkLst>
+          <pc:docMk/>
+          <pc:sldMk cId="103546673" sldId="259"/>
+        </pc:sldMkLst>
+        <pc:picChg chg="add">
+          <ac:chgData name="Isaac-Fukumoto, Yulia-Rhose" userId="6416a4be-602d-4575-8ff4-f8d035edf943" providerId="ADAL" clId="{69D10CC7-7776-4103-99D3-68A8815DCB6B}" dt="2024-06-02T21:33:49.865" v="82" actId="22"/>
+          <ac:picMkLst>
+            <pc:docMk/>
+            <pc:sldMk cId="103546673" sldId="259"/>
+            <ac:picMk id="3" creationId="{A5C6250A-C89D-4CF7-DBEE-418A2D3F1840}"/>
           </ac:picMkLst>
         </pc:picChg>
       </pc:sldChg>
@@ -3648,6 +3664,66 @@
     <p:extLst>
       <p:ext uri="{BB962C8B-B14F-4D97-AF65-F5344CB8AC3E}">
         <p14:creationId xmlns:p14="http://schemas.microsoft.com/office/powerpoint/2010/main" val="3151380865"/>
+      </p:ext>
+    </p:extLst>
+  </p:cSld>
+  <p:clrMapOvr>
+    <a:masterClrMapping/>
+  </p:clrMapOvr>
+</p:sld>
+</file>
+
+<file path=ppt/slides/slide4.xml><?xml version="1.0" encoding="utf-8"?>
+<p:sld xmlns:a="http://schemas.openxmlformats.org/drawingml/2006/main" xmlns:r="http://schemas.openxmlformats.org/officeDocument/2006/relationships" xmlns:p="http://schemas.openxmlformats.org/presentationml/2006/main">
+  <p:cSld>
+    <p:spTree>
+      <p:nvGrpSpPr>
+        <p:cNvPr id="1" name=""/>
+        <p:cNvGrpSpPr/>
+        <p:nvPr/>
+      </p:nvGrpSpPr>
+      <p:grpSpPr>
+        <a:xfrm>
+          <a:off x="0" y="0"/>
+          <a:ext cx="0" cy="0"/>
+          <a:chOff x="0" y="0"/>
+          <a:chExt cx="0" cy="0"/>
+        </a:xfrm>
+      </p:grpSpPr>
+      <p:pic>
+        <p:nvPicPr>
+          <p:cNvPr id="3" name="Image 2">
+            <a:extLst>
+              <a:ext uri="{FF2B5EF4-FFF2-40B4-BE49-F238E27FC236}">
+                <a16:creationId xmlns:a16="http://schemas.microsoft.com/office/drawing/2014/main" id="{A5C6250A-C89D-4CF7-DBEE-418A2D3F1840}"/>
+              </a:ext>
+            </a:extLst>
+          </p:cNvPr>
+          <p:cNvPicPr>
+            <a:picLocks noChangeAspect="1"/>
+          </p:cNvPicPr>
+          <p:nvPr/>
+        </p:nvPicPr>
+        <p:blipFill>
+          <a:blip r:embed="rId2"/>
+          <a:stretch>
+            <a:fillRect/>
+          </a:stretch>
+        </p:blipFill>
+        <p:spPr>
+          <a:xfrm>
+            <a:off x="6037" y="272888"/>
+            <a:ext cx="12179926" cy="6312224"/>
+          </a:xfrm>
+          <a:prstGeom prst="rect">
+            <a:avLst/>
+          </a:prstGeom>
+        </p:spPr>
+      </p:pic>
+    </p:spTree>
+    <p:extLst>
+      <p:ext uri="{BB962C8B-B14F-4D97-AF65-F5344CB8AC3E}">
+        <p14:creationId xmlns:p14="http://schemas.microsoft.com/office/powerpoint/2010/main" val="103546673"/>
       </p:ext>
     </p:extLst>
   </p:cSld>

</xml_diff>

<commit_message>
Ajout de la balise <h2>
</commit_message>
<xml_diff>
--- a/CaptureEcrans.pptx
+++ b/CaptureEcrans.pptx
@@ -9,6 +9,8 @@
     <p:sldId id="256" r:id="rId3"/>
     <p:sldId id="258" r:id="rId4"/>
     <p:sldId id="259" r:id="rId5"/>
+    <p:sldId id="260" r:id="rId6"/>
+    <p:sldId id="261" r:id="rId7"/>
   </p:sldIdLst>
   <p:sldSz cx="12192000" cy="6858000"/>
   <p:notesSz cx="6858000" cy="9144000"/>
@@ -120,7 +122,7 @@
   <pc:docChgLst>
     <pc:chgData name="Isaac-Fukumoto, Yulia-Rhose" userId="6416a4be-602d-4575-8ff4-f8d035edf943" providerId="ADAL" clId="{69D10CC7-7776-4103-99D3-68A8815DCB6B}"/>
     <pc:docChg chg="custSel addSld modSld sldOrd">
-      <pc:chgData name="Isaac-Fukumoto, Yulia-Rhose" userId="6416a4be-602d-4575-8ff4-f8d035edf943" providerId="ADAL" clId="{69D10CC7-7776-4103-99D3-68A8815DCB6B}" dt="2024-06-02T21:33:49.865" v="82" actId="22"/>
+      <pc:chgData name="Isaac-Fukumoto, Yulia-Rhose" userId="6416a4be-602d-4575-8ff4-f8d035edf943" providerId="ADAL" clId="{69D10CC7-7776-4103-99D3-68A8815DCB6B}" dt="2024-06-02T21:50:53.493" v="85" actId="680"/>
       <pc:docMkLst>
         <pc:docMk/>
       </pc:docMkLst>
@@ -191,6 +193,28 @@
             <ac:picMk id="3" creationId="{A5C6250A-C89D-4CF7-DBEE-418A2D3F1840}"/>
           </ac:picMkLst>
         </pc:picChg>
+      </pc:sldChg>
+      <pc:sldChg chg="addSp new mod">
+        <pc:chgData name="Isaac-Fukumoto, Yulia-Rhose" userId="6416a4be-602d-4575-8ff4-f8d035edf943" providerId="ADAL" clId="{69D10CC7-7776-4103-99D3-68A8815DCB6B}" dt="2024-06-02T21:50:15.268" v="84" actId="22"/>
+        <pc:sldMkLst>
+          <pc:docMk/>
+          <pc:sldMk cId="2803512611" sldId="260"/>
+        </pc:sldMkLst>
+        <pc:picChg chg="add">
+          <ac:chgData name="Isaac-Fukumoto, Yulia-Rhose" userId="6416a4be-602d-4575-8ff4-f8d035edf943" providerId="ADAL" clId="{69D10CC7-7776-4103-99D3-68A8815DCB6B}" dt="2024-06-02T21:50:15.268" v="84" actId="22"/>
+          <ac:picMkLst>
+            <pc:docMk/>
+            <pc:sldMk cId="2803512611" sldId="260"/>
+            <ac:picMk id="3" creationId="{8920D1D7-8214-2BA3-2AB7-07F355558EFA}"/>
+          </ac:picMkLst>
+        </pc:picChg>
+      </pc:sldChg>
+      <pc:sldChg chg="new">
+        <pc:chgData name="Isaac-Fukumoto, Yulia-Rhose" userId="6416a4be-602d-4575-8ff4-f8d035edf943" providerId="ADAL" clId="{69D10CC7-7776-4103-99D3-68A8815DCB6B}" dt="2024-06-02T21:50:53.493" v="85" actId="680"/>
+        <pc:sldMkLst>
+          <pc:docMk/>
+          <pc:sldMk cId="3594354300" sldId="261"/>
+        </pc:sldMkLst>
       </pc:sldChg>
     </pc:docChg>
   </pc:docChgLst>
@@ -3724,6 +3748,96 @@
     <p:extLst>
       <p:ext uri="{BB962C8B-B14F-4D97-AF65-F5344CB8AC3E}">
         <p14:creationId xmlns:p14="http://schemas.microsoft.com/office/powerpoint/2010/main" val="103546673"/>
+      </p:ext>
+    </p:extLst>
+  </p:cSld>
+  <p:clrMapOvr>
+    <a:masterClrMapping/>
+  </p:clrMapOvr>
+</p:sld>
+</file>
+
+<file path=ppt/slides/slide5.xml><?xml version="1.0" encoding="utf-8"?>
+<p:sld xmlns:a="http://schemas.openxmlformats.org/drawingml/2006/main" xmlns:r="http://schemas.openxmlformats.org/officeDocument/2006/relationships" xmlns:p="http://schemas.openxmlformats.org/presentationml/2006/main">
+  <p:cSld>
+    <p:spTree>
+      <p:nvGrpSpPr>
+        <p:cNvPr id="1" name=""/>
+        <p:cNvGrpSpPr/>
+        <p:nvPr/>
+      </p:nvGrpSpPr>
+      <p:grpSpPr>
+        <a:xfrm>
+          <a:off x="0" y="0"/>
+          <a:ext cx="0" cy="0"/>
+          <a:chOff x="0" y="0"/>
+          <a:chExt cx="0" cy="0"/>
+        </a:xfrm>
+      </p:grpSpPr>
+      <p:pic>
+        <p:nvPicPr>
+          <p:cNvPr id="3" name="Image 2">
+            <a:extLst>
+              <a:ext uri="{FF2B5EF4-FFF2-40B4-BE49-F238E27FC236}">
+                <a16:creationId xmlns:a16="http://schemas.microsoft.com/office/drawing/2014/main" id="{8920D1D7-8214-2BA3-2AB7-07F355558EFA}"/>
+              </a:ext>
+            </a:extLst>
+          </p:cNvPr>
+          <p:cNvPicPr>
+            <a:picLocks noChangeAspect="1"/>
+          </p:cNvPicPr>
+          <p:nvPr/>
+        </p:nvPicPr>
+        <p:blipFill>
+          <a:blip r:embed="rId2"/>
+          <a:stretch>
+            <a:fillRect/>
+          </a:stretch>
+        </p:blipFill>
+        <p:spPr>
+          <a:xfrm>
+            <a:off x="3047843" y="6174"/>
+            <a:ext cx="6096313" cy="6845652"/>
+          </a:xfrm>
+          <a:prstGeom prst="rect">
+            <a:avLst/>
+          </a:prstGeom>
+        </p:spPr>
+      </p:pic>
+    </p:spTree>
+    <p:extLst>
+      <p:ext uri="{BB962C8B-B14F-4D97-AF65-F5344CB8AC3E}">
+        <p14:creationId xmlns:p14="http://schemas.microsoft.com/office/powerpoint/2010/main" val="2803512611"/>
+      </p:ext>
+    </p:extLst>
+  </p:cSld>
+  <p:clrMapOvr>
+    <a:masterClrMapping/>
+  </p:clrMapOvr>
+</p:sld>
+</file>
+
+<file path=ppt/slides/slide6.xml><?xml version="1.0" encoding="utf-8"?>
+<p:sld xmlns:a="http://schemas.openxmlformats.org/drawingml/2006/main" xmlns:r="http://schemas.openxmlformats.org/officeDocument/2006/relationships" xmlns:p="http://schemas.openxmlformats.org/presentationml/2006/main">
+  <p:cSld>
+    <p:spTree>
+      <p:nvGrpSpPr>
+        <p:cNvPr id="1" name=""/>
+        <p:cNvGrpSpPr/>
+        <p:nvPr/>
+      </p:nvGrpSpPr>
+      <p:grpSpPr>
+        <a:xfrm>
+          <a:off x="0" y="0"/>
+          <a:ext cx="0" cy="0"/>
+          <a:chOff x="0" y="0"/>
+          <a:chExt cx="0" cy="0"/>
+        </a:xfrm>
+      </p:grpSpPr>
+    </p:spTree>
+    <p:extLst>
+      <p:ext uri="{BB962C8B-B14F-4D97-AF65-F5344CB8AC3E}">
+        <p14:creationId xmlns:p14="http://schemas.microsoft.com/office/powerpoint/2010/main" val="3594354300"/>
       </p:ext>
     </p:extLst>
   </p:cSld>

</xml_diff>

<commit_message>
Ajout de la cinquième et de la sixième capture d'écrans
</commit_message>
<xml_diff>
--- a/CaptureEcrans.pptx
+++ b/CaptureEcrans.pptx
@@ -11,6 +11,7 @@
     <p:sldId id="259" r:id="rId5"/>
     <p:sldId id="260" r:id="rId6"/>
     <p:sldId id="261" r:id="rId7"/>
+    <p:sldId id="262" r:id="rId8"/>
   </p:sldIdLst>
   <p:sldSz cx="12192000" cy="6858000"/>
   <p:notesSz cx="6858000" cy="9144000"/>
@@ -122,7 +123,7 @@
   <pc:docChgLst>
     <pc:chgData name="Isaac-Fukumoto, Yulia-Rhose" userId="6416a4be-602d-4575-8ff4-f8d035edf943" providerId="ADAL" clId="{69D10CC7-7776-4103-99D3-68A8815DCB6B}"/>
     <pc:docChg chg="custSel addSld modSld sldOrd">
-      <pc:chgData name="Isaac-Fukumoto, Yulia-Rhose" userId="6416a4be-602d-4575-8ff4-f8d035edf943" providerId="ADAL" clId="{69D10CC7-7776-4103-99D3-68A8815DCB6B}" dt="2024-06-02T21:50:53.493" v="85" actId="680"/>
+      <pc:chgData name="Isaac-Fukumoto, Yulia-Rhose" userId="6416a4be-602d-4575-8ff4-f8d035edf943" providerId="ADAL" clId="{69D10CC7-7776-4103-99D3-68A8815DCB6B}" dt="2024-06-02T21:55:21.892" v="88" actId="22"/>
       <pc:docMkLst>
         <pc:docMk/>
       </pc:docMkLst>
@@ -209,12 +210,35 @@
           </ac:picMkLst>
         </pc:picChg>
       </pc:sldChg>
-      <pc:sldChg chg="new">
-        <pc:chgData name="Isaac-Fukumoto, Yulia-Rhose" userId="6416a4be-602d-4575-8ff4-f8d035edf943" providerId="ADAL" clId="{69D10CC7-7776-4103-99D3-68A8815DCB6B}" dt="2024-06-02T21:50:53.493" v="85" actId="680"/>
+      <pc:sldChg chg="addSp new mod">
+        <pc:chgData name="Isaac-Fukumoto, Yulia-Rhose" userId="6416a4be-602d-4575-8ff4-f8d035edf943" providerId="ADAL" clId="{69D10CC7-7776-4103-99D3-68A8815DCB6B}" dt="2024-06-02T21:54:26.637" v="86" actId="22"/>
         <pc:sldMkLst>
           <pc:docMk/>
           <pc:sldMk cId="3594354300" sldId="261"/>
         </pc:sldMkLst>
+        <pc:picChg chg="add">
+          <ac:chgData name="Isaac-Fukumoto, Yulia-Rhose" userId="6416a4be-602d-4575-8ff4-f8d035edf943" providerId="ADAL" clId="{69D10CC7-7776-4103-99D3-68A8815DCB6B}" dt="2024-06-02T21:54:26.637" v="86" actId="22"/>
+          <ac:picMkLst>
+            <pc:docMk/>
+            <pc:sldMk cId="3594354300" sldId="261"/>
+            <ac:picMk id="3" creationId="{9FD694FD-4889-980B-0FE9-EAC8702AE8BE}"/>
+          </ac:picMkLst>
+        </pc:picChg>
+      </pc:sldChg>
+      <pc:sldChg chg="addSp new mod">
+        <pc:chgData name="Isaac-Fukumoto, Yulia-Rhose" userId="6416a4be-602d-4575-8ff4-f8d035edf943" providerId="ADAL" clId="{69D10CC7-7776-4103-99D3-68A8815DCB6B}" dt="2024-06-02T21:55:21.892" v="88" actId="22"/>
+        <pc:sldMkLst>
+          <pc:docMk/>
+          <pc:sldMk cId="2211084242" sldId="262"/>
+        </pc:sldMkLst>
+        <pc:picChg chg="add">
+          <ac:chgData name="Isaac-Fukumoto, Yulia-Rhose" userId="6416a4be-602d-4575-8ff4-f8d035edf943" providerId="ADAL" clId="{69D10CC7-7776-4103-99D3-68A8815DCB6B}" dt="2024-06-02T21:55:21.892" v="88" actId="22"/>
+          <ac:picMkLst>
+            <pc:docMk/>
+            <pc:sldMk cId="2211084242" sldId="262"/>
+            <ac:picMk id="3" creationId="{7C5FBB9B-C716-7998-EA5E-4A337889643A}"/>
+          </ac:picMkLst>
+        </pc:picChg>
       </pc:sldChg>
     </pc:docChg>
   </pc:docChgLst>
@@ -3834,10 +3858,100 @@
           <a:chExt cx="0" cy="0"/>
         </a:xfrm>
       </p:grpSpPr>
+      <p:pic>
+        <p:nvPicPr>
+          <p:cNvPr id="3" name="Image 2">
+            <a:extLst>
+              <a:ext uri="{FF2B5EF4-FFF2-40B4-BE49-F238E27FC236}">
+                <a16:creationId xmlns:a16="http://schemas.microsoft.com/office/drawing/2014/main" id="{9FD694FD-4889-980B-0FE9-EAC8702AE8BE}"/>
+              </a:ext>
+            </a:extLst>
+          </p:cNvPr>
+          <p:cNvPicPr>
+            <a:picLocks noChangeAspect="1"/>
+          </p:cNvPicPr>
+          <p:nvPr/>
+        </p:nvPicPr>
+        <p:blipFill>
+          <a:blip r:embed="rId2"/>
+          <a:stretch>
+            <a:fillRect/>
+          </a:stretch>
+        </p:blipFill>
+        <p:spPr>
+          <a:xfrm>
+            <a:off x="6037" y="6174"/>
+            <a:ext cx="12179926" cy="6845652"/>
+          </a:xfrm>
+          <a:prstGeom prst="rect">
+            <a:avLst/>
+          </a:prstGeom>
+        </p:spPr>
+      </p:pic>
     </p:spTree>
     <p:extLst>
       <p:ext uri="{BB962C8B-B14F-4D97-AF65-F5344CB8AC3E}">
         <p14:creationId xmlns:p14="http://schemas.microsoft.com/office/powerpoint/2010/main" val="3594354300"/>
+      </p:ext>
+    </p:extLst>
+  </p:cSld>
+  <p:clrMapOvr>
+    <a:masterClrMapping/>
+  </p:clrMapOvr>
+</p:sld>
+</file>
+
+<file path=ppt/slides/slide7.xml><?xml version="1.0" encoding="utf-8"?>
+<p:sld xmlns:a="http://schemas.openxmlformats.org/drawingml/2006/main" xmlns:r="http://schemas.openxmlformats.org/officeDocument/2006/relationships" xmlns:p="http://schemas.openxmlformats.org/presentationml/2006/main">
+  <p:cSld>
+    <p:spTree>
+      <p:nvGrpSpPr>
+        <p:cNvPr id="1" name=""/>
+        <p:cNvGrpSpPr/>
+        <p:nvPr/>
+      </p:nvGrpSpPr>
+      <p:grpSpPr>
+        <a:xfrm>
+          <a:off x="0" y="0"/>
+          <a:ext cx="0" cy="0"/>
+          <a:chOff x="0" y="0"/>
+          <a:chExt cx="0" cy="0"/>
+        </a:xfrm>
+      </p:grpSpPr>
+      <p:pic>
+        <p:nvPicPr>
+          <p:cNvPr id="3" name="Image 2">
+            <a:extLst>
+              <a:ext uri="{FF2B5EF4-FFF2-40B4-BE49-F238E27FC236}">
+                <a16:creationId xmlns:a16="http://schemas.microsoft.com/office/drawing/2014/main" id="{7C5FBB9B-C716-7998-EA5E-4A337889643A}"/>
+              </a:ext>
+            </a:extLst>
+          </p:cNvPr>
+          <p:cNvPicPr>
+            <a:picLocks noChangeAspect="1"/>
+          </p:cNvPicPr>
+          <p:nvPr/>
+        </p:nvPicPr>
+        <p:blipFill>
+          <a:blip r:embed="rId2"/>
+          <a:stretch>
+            <a:fillRect/>
+          </a:stretch>
+        </p:blipFill>
+        <p:spPr>
+          <a:xfrm>
+            <a:off x="25088" y="25225"/>
+            <a:ext cx="12141824" cy="6807550"/>
+          </a:xfrm>
+          <a:prstGeom prst="rect">
+            <a:avLst/>
+          </a:prstGeom>
+        </p:spPr>
+      </p:pic>
+    </p:spTree>
+    <p:extLst>
+      <p:ext uri="{BB962C8B-B14F-4D97-AF65-F5344CB8AC3E}">
+        <p14:creationId xmlns:p14="http://schemas.microsoft.com/office/powerpoint/2010/main" val="2211084242"/>
       </p:ext>
     </p:extLst>
   </p:cSld>

</xml_diff>

<commit_message>
Ajout de la balise <p> dans le document html et ajout de la septième capture d'écrans
</commit_message>
<xml_diff>
--- a/CaptureEcrans.pptx
+++ b/CaptureEcrans.pptx
@@ -6,12 +6,13 @@
   </p:sldMasterIdLst>
   <p:sldIdLst>
     <p:sldId id="257" r:id="rId2"/>
-    <p:sldId id="256" r:id="rId3"/>
-    <p:sldId id="258" r:id="rId4"/>
-    <p:sldId id="259" r:id="rId5"/>
-    <p:sldId id="260" r:id="rId6"/>
-    <p:sldId id="261" r:id="rId7"/>
-    <p:sldId id="262" r:id="rId8"/>
+    <p:sldId id="263" r:id="rId3"/>
+    <p:sldId id="256" r:id="rId4"/>
+    <p:sldId id="258" r:id="rId5"/>
+    <p:sldId id="259" r:id="rId6"/>
+    <p:sldId id="260" r:id="rId7"/>
+    <p:sldId id="261" r:id="rId8"/>
+    <p:sldId id="262" r:id="rId9"/>
   </p:sldIdLst>
   <p:sldSz cx="12192000" cy="6858000"/>
   <p:notesSz cx="6858000" cy="9144000"/>
@@ -123,7 +124,7 @@
   <pc:docChgLst>
     <pc:chgData name="Isaac-Fukumoto, Yulia-Rhose" userId="6416a4be-602d-4575-8ff4-f8d035edf943" providerId="ADAL" clId="{69D10CC7-7776-4103-99D3-68A8815DCB6B}"/>
     <pc:docChg chg="custSel addSld modSld sldOrd">
-      <pc:chgData name="Isaac-Fukumoto, Yulia-Rhose" userId="6416a4be-602d-4575-8ff4-f8d035edf943" providerId="ADAL" clId="{69D10CC7-7776-4103-99D3-68A8815DCB6B}" dt="2024-06-02T21:55:21.892" v="88" actId="22"/>
+      <pc:chgData name="Isaac-Fukumoto, Yulia-Rhose" userId="6416a4be-602d-4575-8ff4-f8d035edf943" providerId="ADAL" clId="{69D10CC7-7776-4103-99D3-68A8815DCB6B}" dt="2024-06-02T21:57:08.063" v="90" actId="22"/>
       <pc:docMkLst>
         <pc:docMk/>
       </pc:docMkLst>
@@ -237,6 +238,21 @@
             <pc:docMk/>
             <pc:sldMk cId="2211084242" sldId="262"/>
             <ac:picMk id="3" creationId="{7C5FBB9B-C716-7998-EA5E-4A337889643A}"/>
+          </ac:picMkLst>
+        </pc:picChg>
+      </pc:sldChg>
+      <pc:sldChg chg="addSp new mod">
+        <pc:chgData name="Isaac-Fukumoto, Yulia-Rhose" userId="6416a4be-602d-4575-8ff4-f8d035edf943" providerId="ADAL" clId="{69D10CC7-7776-4103-99D3-68A8815DCB6B}" dt="2024-06-02T21:57:08.063" v="90" actId="22"/>
+        <pc:sldMkLst>
+          <pc:docMk/>
+          <pc:sldMk cId="4169192915" sldId="263"/>
+        </pc:sldMkLst>
+        <pc:picChg chg="add">
+          <ac:chgData name="Isaac-Fukumoto, Yulia-Rhose" userId="6416a4be-602d-4575-8ff4-f8d035edf943" providerId="ADAL" clId="{69D10CC7-7776-4103-99D3-68A8815DCB6B}" dt="2024-06-02T21:57:08.063" v="90" actId="22"/>
+          <ac:picMkLst>
+            <pc:docMk/>
+            <pc:sldMk cId="4169192915" sldId="263"/>
+            <ac:picMk id="5" creationId="{F1CCBE34-F3FC-9696-FD27-C6EBCE035712}"/>
           </ac:picMkLst>
         </pc:picChg>
       </pc:sldChg>
@@ -3573,6 +3589,116 @@
           <p:cNvPr id="2" name="Titre 1">
             <a:extLst>
               <a:ext uri="{FF2B5EF4-FFF2-40B4-BE49-F238E27FC236}">
+                <a16:creationId xmlns:a16="http://schemas.microsoft.com/office/drawing/2014/main" id="{9DAED44A-9239-60AB-86E8-7D5CD45773E6}"/>
+              </a:ext>
+            </a:extLst>
+          </p:cNvPr>
+          <p:cNvSpPr>
+            <a:spLocks noGrp="1"/>
+          </p:cNvSpPr>
+          <p:nvPr>
+            <p:ph type="title"/>
+          </p:nvPr>
+        </p:nvSpPr>
+        <p:spPr/>
+        <p:txBody>
+          <a:bodyPr/>
+          <a:lstStyle/>
+          <a:p>
+            <a:endParaRPr lang="fr-CA"/>
+          </a:p>
+        </p:txBody>
+      </p:sp>
+      <p:sp>
+        <p:nvSpPr>
+          <p:cNvPr id="3" name="Espace réservé du contenu 2">
+            <a:extLst>
+              <a:ext uri="{FF2B5EF4-FFF2-40B4-BE49-F238E27FC236}">
+                <a16:creationId xmlns:a16="http://schemas.microsoft.com/office/drawing/2014/main" id="{848E7DAC-19FF-E691-1C34-3FDC141A57A7}"/>
+              </a:ext>
+            </a:extLst>
+          </p:cNvPr>
+          <p:cNvSpPr>
+            <a:spLocks noGrp="1"/>
+          </p:cNvSpPr>
+          <p:nvPr>
+            <p:ph idx="1"/>
+          </p:nvPr>
+        </p:nvSpPr>
+        <p:spPr/>
+        <p:txBody>
+          <a:bodyPr/>
+          <a:lstStyle/>
+          <a:p>
+            <a:endParaRPr lang="fr-CA"/>
+          </a:p>
+        </p:txBody>
+      </p:sp>
+      <p:pic>
+        <p:nvPicPr>
+          <p:cNvPr id="5" name="Image 4">
+            <a:extLst>
+              <a:ext uri="{FF2B5EF4-FFF2-40B4-BE49-F238E27FC236}">
+                <a16:creationId xmlns:a16="http://schemas.microsoft.com/office/drawing/2014/main" id="{F1CCBE34-F3FC-9696-FD27-C6EBCE035712}"/>
+              </a:ext>
+            </a:extLst>
+          </p:cNvPr>
+          <p:cNvPicPr>
+            <a:picLocks noChangeAspect="1"/>
+          </p:cNvPicPr>
+          <p:nvPr/>
+        </p:nvPicPr>
+        <p:blipFill>
+          <a:blip r:embed="rId2"/>
+          <a:stretch>
+            <a:fillRect/>
+          </a:stretch>
+        </p:blipFill>
+        <p:spPr>
+          <a:xfrm>
+            <a:off x="6037" y="6174"/>
+            <a:ext cx="12179926" cy="6845652"/>
+          </a:xfrm>
+          <a:prstGeom prst="rect">
+            <a:avLst/>
+          </a:prstGeom>
+        </p:spPr>
+      </p:pic>
+    </p:spTree>
+    <p:extLst>
+      <p:ext uri="{BB962C8B-B14F-4D97-AF65-F5344CB8AC3E}">
+        <p14:creationId xmlns:p14="http://schemas.microsoft.com/office/powerpoint/2010/main" val="4169192915"/>
+      </p:ext>
+    </p:extLst>
+  </p:cSld>
+  <p:clrMapOvr>
+    <a:masterClrMapping/>
+  </p:clrMapOvr>
+</p:sld>
+</file>
+
+<file path=ppt/slides/slide3.xml><?xml version="1.0" encoding="utf-8"?>
+<p:sld xmlns:a="http://schemas.openxmlformats.org/drawingml/2006/main" xmlns:r="http://schemas.openxmlformats.org/officeDocument/2006/relationships" xmlns:p="http://schemas.openxmlformats.org/presentationml/2006/main">
+  <p:cSld>
+    <p:spTree>
+      <p:nvGrpSpPr>
+        <p:cNvPr id="1" name=""/>
+        <p:cNvGrpSpPr/>
+        <p:nvPr/>
+      </p:nvGrpSpPr>
+      <p:grpSpPr>
+        <a:xfrm>
+          <a:off x="0" y="0"/>
+          <a:ext cx="0" cy="0"/>
+          <a:chOff x="0" y="0"/>
+          <a:chExt cx="0" cy="0"/>
+        </a:xfrm>
+      </p:grpSpPr>
+      <p:sp>
+        <p:nvSpPr>
+          <p:cNvPr id="2" name="Titre 1">
+            <a:extLst>
+              <a:ext uri="{FF2B5EF4-FFF2-40B4-BE49-F238E27FC236}">
                 <a16:creationId xmlns:a16="http://schemas.microsoft.com/office/drawing/2014/main" id="{CA3BBA21-4A0B-EB73-6F4C-EE81FAFA414E}"/>
               </a:ext>
             </a:extLst>
@@ -3661,7 +3787,7 @@
 </p:sld>
 </file>
 
-<file path=ppt/slides/slide3.xml><?xml version="1.0" encoding="utf-8"?>
+<file path=ppt/slides/slide4.xml><?xml version="1.0" encoding="utf-8"?>
 <p:sld xmlns:a="http://schemas.openxmlformats.org/drawingml/2006/main" xmlns:r="http://schemas.openxmlformats.org/officeDocument/2006/relationships" xmlns:p="http://schemas.openxmlformats.org/presentationml/2006/main">
   <p:cSld>
     <p:spTree>
@@ -3721,7 +3847,7 @@
 </p:sld>
 </file>
 
-<file path=ppt/slides/slide4.xml><?xml version="1.0" encoding="utf-8"?>
+<file path=ppt/slides/slide5.xml><?xml version="1.0" encoding="utf-8"?>
 <p:sld xmlns:a="http://schemas.openxmlformats.org/drawingml/2006/main" xmlns:r="http://schemas.openxmlformats.org/officeDocument/2006/relationships" xmlns:p="http://schemas.openxmlformats.org/presentationml/2006/main">
   <p:cSld>
     <p:spTree>
@@ -3781,7 +3907,7 @@
 </p:sld>
 </file>
 
-<file path=ppt/slides/slide5.xml><?xml version="1.0" encoding="utf-8"?>
+<file path=ppt/slides/slide6.xml><?xml version="1.0" encoding="utf-8"?>
 <p:sld xmlns:a="http://schemas.openxmlformats.org/drawingml/2006/main" xmlns:r="http://schemas.openxmlformats.org/officeDocument/2006/relationships" xmlns:p="http://schemas.openxmlformats.org/presentationml/2006/main">
   <p:cSld>
     <p:spTree>
@@ -3841,7 +3967,7 @@
 </p:sld>
 </file>
 
-<file path=ppt/slides/slide6.xml><?xml version="1.0" encoding="utf-8"?>
+<file path=ppt/slides/slide7.xml><?xml version="1.0" encoding="utf-8"?>
 <p:sld xmlns:a="http://schemas.openxmlformats.org/drawingml/2006/main" xmlns:r="http://schemas.openxmlformats.org/officeDocument/2006/relationships" xmlns:p="http://schemas.openxmlformats.org/presentationml/2006/main">
   <p:cSld>
     <p:spTree>
@@ -3901,7 +4027,7 @@
 </p:sld>
 </file>
 
-<file path=ppt/slides/slide7.xml><?xml version="1.0" encoding="utf-8"?>
+<file path=ppt/slides/slide8.xml><?xml version="1.0" encoding="utf-8"?>
 <p:sld xmlns:a="http://schemas.openxmlformats.org/drawingml/2006/main" xmlns:r="http://schemas.openxmlformats.org/officeDocument/2006/relationships" xmlns:p="http://schemas.openxmlformats.org/presentationml/2006/main">
   <p:cSld>
     <p:spTree>

</xml_diff>

<commit_message>
Ajout de la huitième et de la neuvième capture d'écrans
</commit_message>
<xml_diff>
--- a/CaptureEcrans.pptx
+++ b/CaptureEcrans.pptx
@@ -13,6 +13,8 @@
     <p:sldId id="260" r:id="rId7"/>
     <p:sldId id="261" r:id="rId8"/>
     <p:sldId id="262" r:id="rId9"/>
+    <p:sldId id="264" r:id="rId10"/>
+    <p:sldId id="265" r:id="rId11"/>
   </p:sldIdLst>
   <p:sldSz cx="12192000" cy="6858000"/>
   <p:notesSz cx="6858000" cy="9144000"/>
@@ -124,7 +126,7 @@
   <pc:docChgLst>
     <pc:chgData name="Isaac-Fukumoto, Yulia-Rhose" userId="6416a4be-602d-4575-8ff4-f8d035edf943" providerId="ADAL" clId="{69D10CC7-7776-4103-99D3-68A8815DCB6B}"/>
     <pc:docChg chg="custSel addSld modSld sldOrd">
-      <pc:chgData name="Isaac-Fukumoto, Yulia-Rhose" userId="6416a4be-602d-4575-8ff4-f8d035edf943" providerId="ADAL" clId="{69D10CC7-7776-4103-99D3-68A8815DCB6B}" dt="2024-06-02T21:57:08.063" v="90" actId="22"/>
+      <pc:chgData name="Isaac-Fukumoto, Yulia-Rhose" userId="6416a4be-602d-4575-8ff4-f8d035edf943" providerId="ADAL" clId="{69D10CC7-7776-4103-99D3-68A8815DCB6B}" dt="2024-06-02T22:24:25.819" v="94" actId="22"/>
       <pc:docMkLst>
         <pc:docMk/>
       </pc:docMkLst>
@@ -253,6 +255,36 @@
             <pc:docMk/>
             <pc:sldMk cId="4169192915" sldId="263"/>
             <ac:picMk id="5" creationId="{F1CCBE34-F3FC-9696-FD27-C6EBCE035712}"/>
+          </ac:picMkLst>
+        </pc:picChg>
+      </pc:sldChg>
+      <pc:sldChg chg="addSp new mod">
+        <pc:chgData name="Isaac-Fukumoto, Yulia-Rhose" userId="6416a4be-602d-4575-8ff4-f8d035edf943" providerId="ADAL" clId="{69D10CC7-7776-4103-99D3-68A8815DCB6B}" dt="2024-06-02T22:24:07.382" v="92" actId="22"/>
+        <pc:sldMkLst>
+          <pc:docMk/>
+          <pc:sldMk cId="2400699069" sldId="264"/>
+        </pc:sldMkLst>
+        <pc:picChg chg="add">
+          <ac:chgData name="Isaac-Fukumoto, Yulia-Rhose" userId="6416a4be-602d-4575-8ff4-f8d035edf943" providerId="ADAL" clId="{69D10CC7-7776-4103-99D3-68A8815DCB6B}" dt="2024-06-02T22:24:07.382" v="92" actId="22"/>
+          <ac:picMkLst>
+            <pc:docMk/>
+            <pc:sldMk cId="2400699069" sldId="264"/>
+            <ac:picMk id="3" creationId="{F3E107F9-6E45-D0E7-7858-D0858D8AD605}"/>
+          </ac:picMkLst>
+        </pc:picChg>
+      </pc:sldChg>
+      <pc:sldChg chg="addSp new mod">
+        <pc:chgData name="Isaac-Fukumoto, Yulia-Rhose" userId="6416a4be-602d-4575-8ff4-f8d035edf943" providerId="ADAL" clId="{69D10CC7-7776-4103-99D3-68A8815DCB6B}" dt="2024-06-02T22:24:25.819" v="94" actId="22"/>
+        <pc:sldMkLst>
+          <pc:docMk/>
+          <pc:sldMk cId="992000974" sldId="265"/>
+        </pc:sldMkLst>
+        <pc:picChg chg="add">
+          <ac:chgData name="Isaac-Fukumoto, Yulia-Rhose" userId="6416a4be-602d-4575-8ff4-f8d035edf943" providerId="ADAL" clId="{69D10CC7-7776-4103-99D3-68A8815DCB6B}" dt="2024-06-02T22:24:25.819" v="94" actId="22"/>
+          <ac:picMkLst>
+            <pc:docMk/>
+            <pc:sldMk cId="992000974" sldId="265"/>
+            <ac:picMk id="3" creationId="{F6EE6B5B-A7A2-26A6-086C-9791C4DFEEE0}"/>
           </ac:picMkLst>
         </pc:picChg>
       </pc:sldChg>
@@ -3567,6 +3599,66 @@
 </p:sld>
 </file>
 
+<file path=ppt/slides/slide10.xml><?xml version="1.0" encoding="utf-8"?>
+<p:sld xmlns:a="http://schemas.openxmlformats.org/drawingml/2006/main" xmlns:r="http://schemas.openxmlformats.org/officeDocument/2006/relationships" xmlns:p="http://schemas.openxmlformats.org/presentationml/2006/main">
+  <p:cSld>
+    <p:spTree>
+      <p:nvGrpSpPr>
+        <p:cNvPr id="1" name=""/>
+        <p:cNvGrpSpPr/>
+        <p:nvPr/>
+      </p:nvGrpSpPr>
+      <p:grpSpPr>
+        <a:xfrm>
+          <a:off x="0" y="0"/>
+          <a:ext cx="0" cy="0"/>
+          <a:chOff x="0" y="0"/>
+          <a:chExt cx="0" cy="0"/>
+        </a:xfrm>
+      </p:grpSpPr>
+      <p:pic>
+        <p:nvPicPr>
+          <p:cNvPr id="3" name="Image 2">
+            <a:extLst>
+              <a:ext uri="{FF2B5EF4-FFF2-40B4-BE49-F238E27FC236}">
+                <a16:creationId xmlns:a16="http://schemas.microsoft.com/office/drawing/2014/main" id="{F6EE6B5B-A7A2-26A6-086C-9791C4DFEEE0}"/>
+              </a:ext>
+            </a:extLst>
+          </p:cNvPr>
+          <p:cNvPicPr>
+            <a:picLocks noChangeAspect="1"/>
+          </p:cNvPicPr>
+          <p:nvPr/>
+        </p:nvPicPr>
+        <p:blipFill>
+          <a:blip r:embed="rId2"/>
+          <a:stretch>
+            <a:fillRect/>
+          </a:stretch>
+        </p:blipFill>
+        <p:spPr>
+          <a:xfrm>
+            <a:off x="6037" y="6174"/>
+            <a:ext cx="12179926" cy="6845652"/>
+          </a:xfrm>
+          <a:prstGeom prst="rect">
+            <a:avLst/>
+          </a:prstGeom>
+        </p:spPr>
+      </p:pic>
+    </p:spTree>
+    <p:extLst>
+      <p:ext uri="{BB962C8B-B14F-4D97-AF65-F5344CB8AC3E}">
+        <p14:creationId xmlns:p14="http://schemas.microsoft.com/office/powerpoint/2010/main" val="992000974"/>
+      </p:ext>
+    </p:extLst>
+  </p:cSld>
+  <p:clrMapOvr>
+    <a:masterClrMapping/>
+  </p:clrMapOvr>
+</p:sld>
+</file>
+
 <file path=ppt/slides/slide2.xml><?xml version="1.0" encoding="utf-8"?>
 <p:sld xmlns:a="http://schemas.openxmlformats.org/drawingml/2006/main" xmlns:r="http://schemas.openxmlformats.org/officeDocument/2006/relationships" xmlns:p="http://schemas.openxmlformats.org/presentationml/2006/main">
   <p:cSld>
@@ -4078,6 +4170,66 @@
     <p:extLst>
       <p:ext uri="{BB962C8B-B14F-4D97-AF65-F5344CB8AC3E}">
         <p14:creationId xmlns:p14="http://schemas.microsoft.com/office/powerpoint/2010/main" val="2211084242"/>
+      </p:ext>
+    </p:extLst>
+  </p:cSld>
+  <p:clrMapOvr>
+    <a:masterClrMapping/>
+  </p:clrMapOvr>
+</p:sld>
+</file>
+
+<file path=ppt/slides/slide9.xml><?xml version="1.0" encoding="utf-8"?>
+<p:sld xmlns:a="http://schemas.openxmlformats.org/drawingml/2006/main" xmlns:r="http://schemas.openxmlformats.org/officeDocument/2006/relationships" xmlns:p="http://schemas.openxmlformats.org/presentationml/2006/main">
+  <p:cSld>
+    <p:spTree>
+      <p:nvGrpSpPr>
+        <p:cNvPr id="1" name=""/>
+        <p:cNvGrpSpPr/>
+        <p:nvPr/>
+      </p:nvGrpSpPr>
+      <p:grpSpPr>
+        <a:xfrm>
+          <a:off x="0" y="0"/>
+          <a:ext cx="0" cy="0"/>
+          <a:chOff x="0" y="0"/>
+          <a:chExt cx="0" cy="0"/>
+        </a:xfrm>
+      </p:grpSpPr>
+      <p:pic>
+        <p:nvPicPr>
+          <p:cNvPr id="3" name="Image 2">
+            <a:extLst>
+              <a:ext uri="{FF2B5EF4-FFF2-40B4-BE49-F238E27FC236}">
+                <a16:creationId xmlns:a16="http://schemas.microsoft.com/office/drawing/2014/main" id="{F3E107F9-6E45-D0E7-7858-D0858D8AD605}"/>
+              </a:ext>
+            </a:extLst>
+          </p:cNvPr>
+          <p:cNvPicPr>
+            <a:picLocks noChangeAspect="1"/>
+          </p:cNvPicPr>
+          <p:nvPr/>
+        </p:nvPicPr>
+        <p:blipFill>
+          <a:blip r:embed="rId2"/>
+          <a:stretch>
+            <a:fillRect/>
+          </a:stretch>
+        </p:blipFill>
+        <p:spPr>
+          <a:xfrm>
+            <a:off x="25088" y="6174"/>
+            <a:ext cx="12141824" cy="6845652"/>
+          </a:xfrm>
+          <a:prstGeom prst="rect">
+            <a:avLst/>
+          </a:prstGeom>
+        </p:spPr>
+      </p:pic>
+    </p:spTree>
+    <p:extLst>
+      <p:ext uri="{BB962C8B-B14F-4D97-AF65-F5344CB8AC3E}">
+        <p14:creationId xmlns:p14="http://schemas.microsoft.com/office/powerpoint/2010/main" val="2400699069"/>
       </p:ext>
     </p:extLst>
   </p:cSld>

</xml_diff>

<commit_message>
Ajout de la dixième et de la onzième capture d'écrans
</commit_message>
<xml_diff>
--- a/CaptureEcrans.pptx
+++ b/CaptureEcrans.pptx
@@ -15,6 +15,8 @@
     <p:sldId id="262" r:id="rId9"/>
     <p:sldId id="264" r:id="rId10"/>
     <p:sldId id="265" r:id="rId11"/>
+    <p:sldId id="267" r:id="rId12"/>
+    <p:sldId id="266" r:id="rId13"/>
   </p:sldIdLst>
   <p:sldSz cx="12192000" cy="6858000"/>
   <p:notesSz cx="6858000" cy="9144000"/>
@@ -126,7 +128,7 @@
   <pc:docChgLst>
     <pc:chgData name="Isaac-Fukumoto, Yulia-Rhose" userId="6416a4be-602d-4575-8ff4-f8d035edf943" providerId="ADAL" clId="{69D10CC7-7776-4103-99D3-68A8815DCB6B}"/>
     <pc:docChg chg="custSel addSld modSld sldOrd">
-      <pc:chgData name="Isaac-Fukumoto, Yulia-Rhose" userId="6416a4be-602d-4575-8ff4-f8d035edf943" providerId="ADAL" clId="{69D10CC7-7776-4103-99D3-68A8815DCB6B}" dt="2024-06-02T22:24:25.819" v="94" actId="22"/>
+      <pc:chgData name="Isaac-Fukumoto, Yulia-Rhose" userId="6416a4be-602d-4575-8ff4-f8d035edf943" providerId="ADAL" clId="{69D10CC7-7776-4103-99D3-68A8815DCB6B}" dt="2024-06-02T22:28:40.144" v="102" actId="22"/>
       <pc:docMkLst>
         <pc:docMk/>
       </pc:docMkLst>
@@ -288,6 +290,36 @@
           </ac:picMkLst>
         </pc:picChg>
       </pc:sldChg>
+      <pc:sldChg chg="addSp new mod ord">
+        <pc:chgData name="Isaac-Fukumoto, Yulia-Rhose" userId="6416a4be-602d-4575-8ff4-f8d035edf943" providerId="ADAL" clId="{69D10CC7-7776-4103-99D3-68A8815DCB6B}" dt="2024-06-02T22:28:40.144" v="102" actId="22"/>
+        <pc:sldMkLst>
+          <pc:docMk/>
+          <pc:sldMk cId="3015998119" sldId="266"/>
+        </pc:sldMkLst>
+        <pc:picChg chg="add">
+          <ac:chgData name="Isaac-Fukumoto, Yulia-Rhose" userId="6416a4be-602d-4575-8ff4-f8d035edf943" providerId="ADAL" clId="{69D10CC7-7776-4103-99D3-68A8815DCB6B}" dt="2024-06-02T22:28:40.144" v="102" actId="22"/>
+          <ac:picMkLst>
+            <pc:docMk/>
+            <pc:sldMk cId="3015998119" sldId="266"/>
+            <ac:picMk id="5" creationId="{3A0AC207-5FB5-7BEC-CCE4-9550DC9434EB}"/>
+          </ac:picMkLst>
+        </pc:picChg>
+      </pc:sldChg>
+      <pc:sldChg chg="addSp new mod ord">
+        <pc:chgData name="Isaac-Fukumoto, Yulia-Rhose" userId="6416a4be-602d-4575-8ff4-f8d035edf943" providerId="ADAL" clId="{69D10CC7-7776-4103-99D3-68A8815DCB6B}" dt="2024-06-02T22:28:11.623" v="101" actId="22"/>
+        <pc:sldMkLst>
+          <pc:docMk/>
+          <pc:sldMk cId="4212174554" sldId="267"/>
+        </pc:sldMkLst>
+        <pc:picChg chg="add">
+          <ac:chgData name="Isaac-Fukumoto, Yulia-Rhose" userId="6416a4be-602d-4575-8ff4-f8d035edf943" providerId="ADAL" clId="{69D10CC7-7776-4103-99D3-68A8815DCB6B}" dt="2024-06-02T22:28:11.623" v="101" actId="22"/>
+          <ac:picMkLst>
+            <pc:docMk/>
+            <pc:sldMk cId="4212174554" sldId="267"/>
+            <ac:picMk id="5" creationId="{20D72C6E-4D4D-3E65-C330-96AA8242649F}"/>
+          </ac:picMkLst>
+        </pc:picChg>
+      </pc:sldChg>
     </pc:docChg>
   </pc:docChgLst>
 </pc:chgInfo>
@@ -444,7 +476,7 @@
               <a:rPr lang="fr-CA" smtClean="0"/>
               <a:t>2024-06-02</a:t>
             </a:fld>
-            <a:endParaRPr lang="fr-CA"/>
+            <a:endParaRPr lang="fr-CA" dirty="0"/>
           </a:p>
         </p:txBody>
       </p:sp>
@@ -469,7 +501,7 @@
           <a:bodyPr/>
           <a:lstStyle/>
           <a:p>
-            <a:endParaRPr lang="fr-CA"/>
+            <a:endParaRPr lang="fr-CA" dirty="0"/>
           </a:p>
         </p:txBody>
       </p:sp>
@@ -498,7 +530,7 @@
               <a:rPr lang="fr-CA" smtClean="0"/>
               <a:t>‹N°›</a:t>
             </a:fld>
-            <a:endParaRPr lang="fr-CA"/>
+            <a:endParaRPr lang="fr-CA" dirty="0"/>
           </a:p>
         </p:txBody>
       </p:sp>
@@ -644,7 +676,7 @@
               <a:rPr lang="fr-CA" smtClean="0"/>
               <a:t>2024-06-02</a:t>
             </a:fld>
-            <a:endParaRPr lang="fr-CA"/>
+            <a:endParaRPr lang="fr-CA" dirty="0"/>
           </a:p>
         </p:txBody>
       </p:sp>
@@ -669,7 +701,7 @@
           <a:bodyPr/>
           <a:lstStyle/>
           <a:p>
-            <a:endParaRPr lang="fr-CA"/>
+            <a:endParaRPr lang="fr-CA" dirty="0"/>
           </a:p>
         </p:txBody>
       </p:sp>
@@ -698,7 +730,7 @@
               <a:rPr lang="fr-CA" smtClean="0"/>
               <a:t>‹N°›</a:t>
             </a:fld>
-            <a:endParaRPr lang="fr-CA"/>
+            <a:endParaRPr lang="fr-CA" dirty="0"/>
           </a:p>
         </p:txBody>
       </p:sp>
@@ -854,7 +886,7 @@
               <a:rPr lang="fr-CA" smtClean="0"/>
               <a:t>2024-06-02</a:t>
             </a:fld>
-            <a:endParaRPr lang="fr-CA"/>
+            <a:endParaRPr lang="fr-CA" dirty="0"/>
           </a:p>
         </p:txBody>
       </p:sp>
@@ -879,7 +911,7 @@
           <a:bodyPr/>
           <a:lstStyle/>
           <a:p>
-            <a:endParaRPr lang="fr-CA"/>
+            <a:endParaRPr lang="fr-CA" dirty="0"/>
           </a:p>
         </p:txBody>
       </p:sp>
@@ -908,7 +940,7 @@
               <a:rPr lang="fr-CA" smtClean="0"/>
               <a:t>‹N°›</a:t>
             </a:fld>
-            <a:endParaRPr lang="fr-CA"/>
+            <a:endParaRPr lang="fr-CA" dirty="0"/>
           </a:p>
         </p:txBody>
       </p:sp>
@@ -1054,7 +1086,7 @@
               <a:rPr lang="fr-CA" smtClean="0"/>
               <a:t>2024-06-02</a:t>
             </a:fld>
-            <a:endParaRPr lang="fr-CA"/>
+            <a:endParaRPr lang="fr-CA" dirty="0"/>
           </a:p>
         </p:txBody>
       </p:sp>
@@ -1079,7 +1111,7 @@
           <a:bodyPr/>
           <a:lstStyle/>
           <a:p>
-            <a:endParaRPr lang="fr-CA"/>
+            <a:endParaRPr lang="fr-CA" dirty="0"/>
           </a:p>
         </p:txBody>
       </p:sp>
@@ -1108,7 +1140,7 @@
               <a:rPr lang="fr-CA" smtClean="0"/>
               <a:t>‹N°›</a:t>
             </a:fld>
-            <a:endParaRPr lang="fr-CA"/>
+            <a:endParaRPr lang="fr-CA" dirty="0"/>
           </a:p>
         </p:txBody>
       </p:sp>
@@ -1330,7 +1362,7 @@
               <a:rPr lang="fr-CA" smtClean="0"/>
               <a:t>2024-06-02</a:t>
             </a:fld>
-            <a:endParaRPr lang="fr-CA"/>
+            <a:endParaRPr lang="fr-CA" dirty="0"/>
           </a:p>
         </p:txBody>
       </p:sp>
@@ -1355,7 +1387,7 @@
           <a:bodyPr/>
           <a:lstStyle/>
           <a:p>
-            <a:endParaRPr lang="fr-CA"/>
+            <a:endParaRPr lang="fr-CA" dirty="0"/>
           </a:p>
         </p:txBody>
       </p:sp>
@@ -1384,7 +1416,7 @@
               <a:rPr lang="fr-CA" smtClean="0"/>
               <a:t>‹N°›</a:t>
             </a:fld>
-            <a:endParaRPr lang="fr-CA"/>
+            <a:endParaRPr lang="fr-CA" dirty="0"/>
           </a:p>
         </p:txBody>
       </p:sp>
@@ -1598,7 +1630,7 @@
               <a:rPr lang="fr-CA" smtClean="0"/>
               <a:t>2024-06-02</a:t>
             </a:fld>
-            <a:endParaRPr lang="fr-CA"/>
+            <a:endParaRPr lang="fr-CA" dirty="0"/>
           </a:p>
         </p:txBody>
       </p:sp>
@@ -1623,7 +1655,7 @@
           <a:bodyPr/>
           <a:lstStyle/>
           <a:p>
-            <a:endParaRPr lang="fr-CA"/>
+            <a:endParaRPr lang="fr-CA" dirty="0"/>
           </a:p>
         </p:txBody>
       </p:sp>
@@ -1652,7 +1684,7 @@
               <a:rPr lang="fr-CA" smtClean="0"/>
               <a:t>‹N°›</a:t>
             </a:fld>
-            <a:endParaRPr lang="fr-CA"/>
+            <a:endParaRPr lang="fr-CA" dirty="0"/>
           </a:p>
         </p:txBody>
       </p:sp>
@@ -2013,7 +2045,7 @@
               <a:rPr lang="fr-CA" smtClean="0"/>
               <a:t>2024-06-02</a:t>
             </a:fld>
-            <a:endParaRPr lang="fr-CA"/>
+            <a:endParaRPr lang="fr-CA" dirty="0"/>
           </a:p>
         </p:txBody>
       </p:sp>
@@ -2038,7 +2070,7 @@
           <a:bodyPr/>
           <a:lstStyle/>
           <a:p>
-            <a:endParaRPr lang="fr-CA"/>
+            <a:endParaRPr lang="fr-CA" dirty="0"/>
           </a:p>
         </p:txBody>
       </p:sp>
@@ -2067,7 +2099,7 @@
               <a:rPr lang="fr-CA" smtClean="0"/>
               <a:t>‹N°›</a:t>
             </a:fld>
-            <a:endParaRPr lang="fr-CA"/>
+            <a:endParaRPr lang="fr-CA" dirty="0"/>
           </a:p>
         </p:txBody>
       </p:sp>
@@ -2155,7 +2187,7 @@
               <a:rPr lang="fr-CA" smtClean="0"/>
               <a:t>2024-06-02</a:t>
             </a:fld>
-            <a:endParaRPr lang="fr-CA"/>
+            <a:endParaRPr lang="fr-CA" dirty="0"/>
           </a:p>
         </p:txBody>
       </p:sp>
@@ -2180,7 +2212,7 @@
           <a:bodyPr/>
           <a:lstStyle/>
           <a:p>
-            <a:endParaRPr lang="fr-CA"/>
+            <a:endParaRPr lang="fr-CA" dirty="0"/>
           </a:p>
         </p:txBody>
       </p:sp>
@@ -2209,7 +2241,7 @@
               <a:rPr lang="fr-CA" smtClean="0"/>
               <a:t>‹N°›</a:t>
             </a:fld>
-            <a:endParaRPr lang="fr-CA"/>
+            <a:endParaRPr lang="fr-CA" dirty="0"/>
           </a:p>
         </p:txBody>
       </p:sp>
@@ -2268,7 +2300,7 @@
               <a:rPr lang="fr-CA" smtClean="0"/>
               <a:t>2024-06-02</a:t>
             </a:fld>
-            <a:endParaRPr lang="fr-CA"/>
+            <a:endParaRPr lang="fr-CA" dirty="0"/>
           </a:p>
         </p:txBody>
       </p:sp>
@@ -2293,7 +2325,7 @@
           <a:bodyPr/>
           <a:lstStyle/>
           <a:p>
-            <a:endParaRPr lang="fr-CA"/>
+            <a:endParaRPr lang="fr-CA" dirty="0"/>
           </a:p>
         </p:txBody>
       </p:sp>
@@ -2322,7 +2354,7 @@
               <a:rPr lang="fr-CA" smtClean="0"/>
               <a:t>‹N°›</a:t>
             </a:fld>
-            <a:endParaRPr lang="fr-CA"/>
+            <a:endParaRPr lang="fr-CA" dirty="0"/>
           </a:p>
         </p:txBody>
       </p:sp>
@@ -2581,7 +2613,7 @@
               <a:rPr lang="fr-CA" smtClean="0"/>
               <a:t>2024-06-02</a:t>
             </a:fld>
-            <a:endParaRPr lang="fr-CA"/>
+            <a:endParaRPr lang="fr-CA" dirty="0"/>
           </a:p>
         </p:txBody>
       </p:sp>
@@ -2606,7 +2638,7 @@
           <a:bodyPr/>
           <a:lstStyle/>
           <a:p>
-            <a:endParaRPr lang="fr-CA"/>
+            <a:endParaRPr lang="fr-CA" dirty="0"/>
           </a:p>
         </p:txBody>
       </p:sp>
@@ -2635,7 +2667,7 @@
               <a:rPr lang="fr-CA" smtClean="0"/>
               <a:t>‹N°›</a:t>
             </a:fld>
-            <a:endParaRPr lang="fr-CA"/>
+            <a:endParaRPr lang="fr-CA" dirty="0"/>
           </a:p>
         </p:txBody>
       </p:sp>
@@ -2770,7 +2802,7 @@
             </a:lvl9pPr>
           </a:lstStyle>
           <a:p>
-            <a:endParaRPr lang="fr-CA"/>
+            <a:endParaRPr lang="fr-CA" dirty="0"/>
           </a:p>
         </p:txBody>
       </p:sp>
@@ -2870,7 +2902,7 @@
               <a:rPr lang="fr-CA" smtClean="0"/>
               <a:t>2024-06-02</a:t>
             </a:fld>
-            <a:endParaRPr lang="fr-CA"/>
+            <a:endParaRPr lang="fr-CA" dirty="0"/>
           </a:p>
         </p:txBody>
       </p:sp>
@@ -2895,7 +2927,7 @@
           <a:bodyPr/>
           <a:lstStyle/>
           <a:p>
-            <a:endParaRPr lang="fr-CA"/>
+            <a:endParaRPr lang="fr-CA" dirty="0"/>
           </a:p>
         </p:txBody>
       </p:sp>
@@ -2924,7 +2956,7 @@
               <a:rPr lang="fr-CA" smtClean="0"/>
               <a:t>‹N°›</a:t>
             </a:fld>
-            <a:endParaRPr lang="fr-CA"/>
+            <a:endParaRPr lang="fr-CA" dirty="0"/>
           </a:p>
         </p:txBody>
       </p:sp>
@@ -3113,7 +3145,7 @@
               <a:rPr lang="fr-CA" smtClean="0"/>
               <a:t>2024-06-02</a:t>
             </a:fld>
-            <a:endParaRPr lang="fr-CA"/>
+            <a:endParaRPr lang="fr-CA" dirty="0"/>
           </a:p>
         </p:txBody>
       </p:sp>
@@ -3156,7 +3188,7 @@
             </a:lvl1pPr>
           </a:lstStyle>
           <a:p>
-            <a:endParaRPr lang="fr-CA"/>
+            <a:endParaRPr lang="fr-CA" dirty="0"/>
           </a:p>
         </p:txBody>
       </p:sp>
@@ -3203,7 +3235,7 @@
               <a:rPr lang="fr-CA" smtClean="0"/>
               <a:t>‹N°›</a:t>
             </a:fld>
-            <a:endParaRPr lang="fr-CA"/>
+            <a:endParaRPr lang="fr-CA" dirty="0"/>
           </a:p>
         </p:txBody>
       </p:sp>
@@ -3659,6 +3691,226 @@
 </p:sld>
 </file>
 
+<file path=ppt/slides/slide11.xml><?xml version="1.0" encoding="utf-8"?>
+<p:sld xmlns:a="http://schemas.openxmlformats.org/drawingml/2006/main" xmlns:r="http://schemas.openxmlformats.org/officeDocument/2006/relationships" xmlns:p="http://schemas.openxmlformats.org/presentationml/2006/main">
+  <p:cSld>
+    <p:spTree>
+      <p:nvGrpSpPr>
+        <p:cNvPr id="1" name=""/>
+        <p:cNvGrpSpPr/>
+        <p:nvPr/>
+      </p:nvGrpSpPr>
+      <p:grpSpPr>
+        <a:xfrm>
+          <a:off x="0" y="0"/>
+          <a:ext cx="0" cy="0"/>
+          <a:chOff x="0" y="0"/>
+          <a:chExt cx="0" cy="0"/>
+        </a:xfrm>
+      </p:grpSpPr>
+      <p:sp>
+        <p:nvSpPr>
+          <p:cNvPr id="2" name="Titre 1">
+            <a:extLst>
+              <a:ext uri="{FF2B5EF4-FFF2-40B4-BE49-F238E27FC236}">
+                <a16:creationId xmlns:a16="http://schemas.microsoft.com/office/drawing/2014/main" id="{158BB6B7-4869-C8F7-475A-E9E9E583CDAA}"/>
+              </a:ext>
+            </a:extLst>
+          </p:cNvPr>
+          <p:cNvSpPr>
+            <a:spLocks noGrp="1"/>
+          </p:cNvSpPr>
+          <p:nvPr>
+            <p:ph type="title"/>
+          </p:nvPr>
+        </p:nvSpPr>
+        <p:spPr/>
+        <p:txBody>
+          <a:bodyPr/>
+          <a:lstStyle/>
+          <a:p>
+            <a:endParaRPr lang="fr-CA" dirty="0"/>
+          </a:p>
+        </p:txBody>
+      </p:sp>
+      <p:sp>
+        <p:nvSpPr>
+          <p:cNvPr id="3" name="Espace réservé du contenu 2">
+            <a:extLst>
+              <a:ext uri="{FF2B5EF4-FFF2-40B4-BE49-F238E27FC236}">
+                <a16:creationId xmlns:a16="http://schemas.microsoft.com/office/drawing/2014/main" id="{8D32A82D-69BD-9324-DCF1-B77F0710D7B6}"/>
+              </a:ext>
+            </a:extLst>
+          </p:cNvPr>
+          <p:cNvSpPr>
+            <a:spLocks noGrp="1"/>
+          </p:cNvSpPr>
+          <p:nvPr>
+            <p:ph idx="1"/>
+          </p:nvPr>
+        </p:nvSpPr>
+        <p:spPr/>
+        <p:txBody>
+          <a:bodyPr/>
+          <a:lstStyle/>
+          <a:p>
+            <a:endParaRPr lang="fr-CA" dirty="0"/>
+          </a:p>
+        </p:txBody>
+      </p:sp>
+      <p:pic>
+        <p:nvPicPr>
+          <p:cNvPr id="5" name="Image 4">
+            <a:extLst>
+              <a:ext uri="{FF2B5EF4-FFF2-40B4-BE49-F238E27FC236}">
+                <a16:creationId xmlns:a16="http://schemas.microsoft.com/office/drawing/2014/main" id="{20D72C6E-4D4D-3E65-C330-96AA8242649F}"/>
+              </a:ext>
+            </a:extLst>
+          </p:cNvPr>
+          <p:cNvPicPr>
+            <a:picLocks noChangeAspect="1"/>
+          </p:cNvPicPr>
+          <p:nvPr/>
+        </p:nvPicPr>
+        <p:blipFill>
+          <a:blip r:embed="rId2"/>
+          <a:stretch>
+            <a:fillRect/>
+          </a:stretch>
+        </p:blipFill>
+        <p:spPr>
+          <a:xfrm>
+            <a:off x="6037" y="1311166"/>
+            <a:ext cx="12179926" cy="4235668"/>
+          </a:xfrm>
+          <a:prstGeom prst="rect">
+            <a:avLst/>
+          </a:prstGeom>
+        </p:spPr>
+      </p:pic>
+    </p:spTree>
+    <p:extLst>
+      <p:ext uri="{BB962C8B-B14F-4D97-AF65-F5344CB8AC3E}">
+        <p14:creationId xmlns:p14="http://schemas.microsoft.com/office/powerpoint/2010/main" val="4212174554"/>
+      </p:ext>
+    </p:extLst>
+  </p:cSld>
+  <p:clrMapOvr>
+    <a:masterClrMapping/>
+  </p:clrMapOvr>
+</p:sld>
+</file>
+
+<file path=ppt/slides/slide12.xml><?xml version="1.0" encoding="utf-8"?>
+<p:sld xmlns:a="http://schemas.openxmlformats.org/drawingml/2006/main" xmlns:r="http://schemas.openxmlformats.org/officeDocument/2006/relationships" xmlns:p="http://schemas.openxmlformats.org/presentationml/2006/main">
+  <p:cSld>
+    <p:spTree>
+      <p:nvGrpSpPr>
+        <p:cNvPr id="1" name=""/>
+        <p:cNvGrpSpPr/>
+        <p:nvPr/>
+      </p:nvGrpSpPr>
+      <p:grpSpPr>
+        <a:xfrm>
+          <a:off x="0" y="0"/>
+          <a:ext cx="0" cy="0"/>
+          <a:chOff x="0" y="0"/>
+          <a:chExt cx="0" cy="0"/>
+        </a:xfrm>
+      </p:grpSpPr>
+      <p:sp>
+        <p:nvSpPr>
+          <p:cNvPr id="2" name="Titre 1">
+            <a:extLst>
+              <a:ext uri="{FF2B5EF4-FFF2-40B4-BE49-F238E27FC236}">
+                <a16:creationId xmlns:a16="http://schemas.microsoft.com/office/drawing/2014/main" id="{6A7DCEE5-B8F9-462B-5ED1-F3C2208C49FF}"/>
+              </a:ext>
+            </a:extLst>
+          </p:cNvPr>
+          <p:cNvSpPr>
+            <a:spLocks noGrp="1"/>
+          </p:cNvSpPr>
+          <p:nvPr>
+            <p:ph type="title"/>
+          </p:nvPr>
+        </p:nvSpPr>
+        <p:spPr/>
+        <p:txBody>
+          <a:bodyPr/>
+          <a:lstStyle/>
+          <a:p>
+            <a:endParaRPr lang="fr-CA" dirty="0"/>
+          </a:p>
+        </p:txBody>
+      </p:sp>
+      <p:sp>
+        <p:nvSpPr>
+          <p:cNvPr id="3" name="Espace réservé du contenu 2">
+            <a:extLst>
+              <a:ext uri="{FF2B5EF4-FFF2-40B4-BE49-F238E27FC236}">
+                <a16:creationId xmlns:a16="http://schemas.microsoft.com/office/drawing/2014/main" id="{398D2B0A-C545-18B0-9929-B0786AEC4BBB}"/>
+              </a:ext>
+            </a:extLst>
+          </p:cNvPr>
+          <p:cNvSpPr>
+            <a:spLocks noGrp="1"/>
+          </p:cNvSpPr>
+          <p:nvPr>
+            <p:ph idx="1"/>
+          </p:nvPr>
+        </p:nvSpPr>
+        <p:spPr/>
+        <p:txBody>
+          <a:bodyPr/>
+          <a:lstStyle/>
+          <a:p>
+            <a:endParaRPr lang="fr-CA" dirty="0"/>
+          </a:p>
+        </p:txBody>
+      </p:sp>
+      <p:pic>
+        <p:nvPicPr>
+          <p:cNvPr id="5" name="Image 4">
+            <a:extLst>
+              <a:ext uri="{FF2B5EF4-FFF2-40B4-BE49-F238E27FC236}">
+                <a16:creationId xmlns:a16="http://schemas.microsoft.com/office/drawing/2014/main" id="{3A0AC207-5FB5-7BEC-CCE4-9550DC9434EB}"/>
+              </a:ext>
+            </a:extLst>
+          </p:cNvPr>
+          <p:cNvPicPr>
+            <a:picLocks noChangeAspect="1"/>
+          </p:cNvPicPr>
+          <p:nvPr/>
+        </p:nvPicPr>
+        <p:blipFill>
+          <a:blip r:embed="rId2"/>
+          <a:stretch>
+            <a:fillRect/>
+          </a:stretch>
+        </p:blipFill>
+        <p:spPr>
+          <a:xfrm>
+            <a:off x="6037" y="634856"/>
+            <a:ext cx="12179926" cy="5588287"/>
+          </a:xfrm>
+          <a:prstGeom prst="rect">
+            <a:avLst/>
+          </a:prstGeom>
+        </p:spPr>
+      </p:pic>
+    </p:spTree>
+    <p:extLst>
+      <p:ext uri="{BB962C8B-B14F-4D97-AF65-F5344CB8AC3E}">
+        <p14:creationId xmlns:p14="http://schemas.microsoft.com/office/powerpoint/2010/main" val="3015998119"/>
+      </p:ext>
+    </p:extLst>
+  </p:cSld>
+  <p:clrMapOvr>
+    <a:masterClrMapping/>
+  </p:clrMapOvr>
+</p:sld>
+</file>
+
 <file path=ppt/slides/slide2.xml><?xml version="1.0" encoding="utf-8"?>
 <p:sld xmlns:a="http://schemas.openxmlformats.org/drawingml/2006/main" xmlns:r="http://schemas.openxmlformats.org/officeDocument/2006/relationships" xmlns:p="http://schemas.openxmlformats.org/presentationml/2006/main">
   <p:cSld>
@@ -3697,7 +3949,7 @@
           <a:bodyPr/>
           <a:lstStyle/>
           <a:p>
-            <a:endParaRPr lang="fr-CA"/>
+            <a:endParaRPr lang="fr-CA" dirty="0"/>
           </a:p>
         </p:txBody>
       </p:sp>
@@ -3722,7 +3974,7 @@
           <a:bodyPr/>
           <a:lstStyle/>
           <a:p>
-            <a:endParaRPr lang="fr-CA"/>
+            <a:endParaRPr lang="fr-CA" dirty="0"/>
           </a:p>
         </p:txBody>
       </p:sp>
@@ -3807,7 +4059,7 @@
           <a:bodyPr/>
           <a:lstStyle/>
           <a:p>
-            <a:endParaRPr lang="fr-CA"/>
+            <a:endParaRPr lang="fr-CA" dirty="0"/>
           </a:p>
         </p:txBody>
       </p:sp>
@@ -3832,7 +4084,7 @@
           <a:bodyPr/>
           <a:lstStyle/>
           <a:p>
-            <a:endParaRPr lang="fr-CA"/>
+            <a:endParaRPr lang="fr-CA" dirty="0"/>
           </a:p>
         </p:txBody>
       </p:sp>

</xml_diff>